<commit_message>
update ppt for t7
</commit_message>
<xml_diff>
--- a/lab/IS6404 -T7/ Đồ án cuối kỳ/Thuyết trình .pptx
+++ b/lab/IS6404 -T7/ Đồ án cuối kỳ/Thuyết trình .pptx
@@ -7,11 +7,13 @@
   <p:sldIdLst>
     <p:sldId id="256" r:id="rId3"/>
     <p:sldId id="257" r:id="rId4"/>
-    <p:sldId id="258" r:id="rId5"/>
-    <p:sldId id="261" r:id="rId6"/>
-    <p:sldId id="262" r:id="rId7"/>
-    <p:sldId id="259" r:id="rId8"/>
-    <p:sldId id="260" r:id="rId9"/>
+    <p:sldId id="265" r:id="rId5"/>
+    <p:sldId id="266" r:id="rId6"/>
+    <p:sldId id="258" r:id="rId7"/>
+    <p:sldId id="261" r:id="rId8"/>
+    <p:sldId id="262" r:id="rId9"/>
+    <p:sldId id="259" r:id="rId10"/>
+    <p:sldId id="260" r:id="rId11"/>
   </p:sldIdLst>
   <p:sldSz cx="12192000" cy="6858000"/>
   <p:notesSz cx="6858000" cy="9144000"/>
@@ -3947,14 +3949,7 @@
         <p:cNvGrpSpPr/>
         <p:nvPr/>
       </p:nvGrpSpPr>
-      <p:grpSpPr>
-        <a:xfrm>
-          <a:off x="0" y="0"/>
-          <a:ext cx="0" cy="0"/>
-          <a:chOff x="0" y="0"/>
-          <a:chExt cx="0" cy="0"/>
-        </a:xfrm>
-      </p:grpSpPr>
+      <p:grpSpPr/>
       <p:sp>
         <p:nvSpPr>
           <p:cNvPr id="2" name="Title 1"/>
@@ -3965,203 +3960,49 @@
             <p:ph type="title"/>
           </p:nvPr>
         </p:nvSpPr>
-        <p:spPr/>
-        <p:txBody>
-          <a:bodyPr/>
-          <a:lstStyle/>
-          <a:p>
-            <a:r>
-              <a:rPr lang="en-US" dirty="0" err="1"/>
-              <a:t>Đánh</a:t>
-            </a:r>
-            <a:r>
-              <a:rPr lang="en-US" dirty="0"/>
-              <a:t> </a:t>
-            </a:r>
-            <a:r>
-              <a:rPr lang="en-US" dirty="0" err="1"/>
-              <a:t>giá</a:t>
-            </a:r>
-            <a:r>
-              <a:rPr lang="en-US" dirty="0"/>
-              <a:t> </a:t>
-            </a:r>
-            <a:r>
-              <a:rPr lang="en-US" dirty="0" err="1"/>
-              <a:t>độ</a:t>
-            </a:r>
-            <a:r>
-              <a:rPr lang="en-US" dirty="0"/>
-              <a:t> </a:t>
-            </a:r>
-            <a:r>
-              <a:rPr lang="en-US" dirty="0" err="1"/>
-              <a:t>phức</a:t>
-            </a:r>
-            <a:r>
-              <a:rPr lang="en-US" dirty="0"/>
-              <a:t> </a:t>
-            </a:r>
-            <a:r>
-              <a:rPr lang="en-US" dirty="0" err="1"/>
-              <a:t>tạp</a:t>
-            </a:r>
-            <a:r>
-              <a:rPr lang="en-US" dirty="0"/>
-              <a:t> </a:t>
-            </a:r>
-            <a:r>
-              <a:rPr lang="en-US" dirty="0" err="1"/>
-              <a:t>thuật</a:t>
-            </a:r>
-            <a:r>
-              <a:rPr lang="en-US" dirty="0"/>
-              <a:t> </a:t>
-            </a:r>
-            <a:r>
-              <a:rPr lang="en-US" dirty="0" err="1"/>
-              <a:t>toán</a:t>
-            </a:r>
-            <a:r>
-              <a:rPr lang="en-US" dirty="0"/>
-              <a:t> </a:t>
-            </a:r>
-            <a:r>
-              <a:rPr lang="en-US" dirty="0" err="1"/>
-              <a:t>cài</a:t>
-            </a:r>
-            <a:r>
-              <a:rPr lang="en-US" dirty="0"/>
-              <a:t> </a:t>
-            </a:r>
-            <a:r>
-              <a:rPr lang="en-US" dirty="0" err="1"/>
-              <a:t>đặt</a:t>
-            </a:r>
-            <a:endParaRPr lang="en-US" dirty="0"/>
-          </a:p>
-        </p:txBody>
-      </p:sp>
-      <p:sp>
-        <p:nvSpPr>
-          <p:cNvPr id="3" name="Content Placeholder 2"/>
-          <p:cNvSpPr>
-            <a:spLocks noGrp="1"/>
-          </p:cNvSpPr>
+        <p:spPr>
+          <a:xfrm>
+            <a:off x="1324610" y="230505"/>
+            <a:ext cx="10515600" cy="1325563"/>
+          </a:xfrm>
+        </p:spPr>
+        <p:txBody>
+          <a:bodyPr/>
+          <a:p>
+            <a:r>
+              <a:rPr lang="vi-VN" altLang="en-US"/>
+              <a:t>Dữ liệu từ IoT của công ty</a:t>
+            </a:r>
+            <a:endParaRPr lang="vi-VN" altLang="en-US"/>
+          </a:p>
+        </p:txBody>
+      </p:sp>
+      <p:pic>
+        <p:nvPicPr>
+          <p:cNvPr id="4" name="Content Placeholder 3"/>
+          <p:cNvPicPr>
+            <a:picLocks noChangeAspect="1"/>
+          </p:cNvPicPr>
           <p:nvPr>
             <p:ph idx="1"/>
           </p:nvPr>
-        </p:nvSpPr>
-        <p:spPr/>
-        <p:txBody>
-          <a:bodyPr>
-            <a:normAutofit/>
-          </a:bodyPr>
-          <a:lstStyle/>
-          <a:p>
-            <a:pPr>
-              <a:buFont typeface="Arial" panose="020B0604020202090204" pitchFamily="34" charset="0"/>
-              <a:buChar char="•"/>
-            </a:pPr>
-            <a:r>
-              <a:rPr lang="vi-VN" b="1" dirty="0"/>
-              <a:t>Hồi quy Logistic:</a:t>
-            </a:r>
-            <a:endParaRPr lang="vi-VN" b="1" dirty="0"/>
-          </a:p>
-          <a:p>
-            <a:pPr lvl="1">
-              <a:buFont typeface="Wingdings" panose="05000000000000000000" pitchFamily="2" charset="2"/>
-              <a:buChar char="Ø"/>
-            </a:pPr>
-            <a:r>
-              <a:rPr lang="vi-VN" dirty="0"/>
-              <a:t>Độ phức tạp thời gian: O(n * p)</a:t>
-            </a:r>
-            <a:endParaRPr lang="vi-VN" dirty="0"/>
-          </a:p>
-          <a:p>
-            <a:pPr lvl="1">
-              <a:buFont typeface="Wingdings" panose="05000000000000000000" pitchFamily="2" charset="2"/>
-              <a:buChar char="Ø"/>
-            </a:pPr>
-            <a:r>
-              <a:rPr lang="vi-VN" dirty="0"/>
-              <a:t>n: số lượng mẫu, p: số lượng đặc trưng.</a:t>
-            </a:r>
-            <a:endParaRPr lang="vi-VN" dirty="0"/>
-          </a:p>
-          <a:p>
-            <a:pPr>
-              <a:buFont typeface="Arial" panose="020B0604020202090204" pitchFamily="34" charset="0"/>
-              <a:buChar char="•"/>
-            </a:pPr>
-            <a:r>
-              <a:rPr lang="vi-VN" b="1" dirty="0"/>
-              <a:t>Mạng Neural (MLP):</a:t>
-            </a:r>
-            <a:endParaRPr lang="vi-VN" b="1" dirty="0"/>
-          </a:p>
-          <a:p>
-            <a:pPr lvl="1">
-              <a:buFont typeface="Wingdings" panose="05000000000000000000" pitchFamily="2" charset="2"/>
-              <a:buChar char="Ø"/>
-            </a:pPr>
-            <a:r>
-              <a:rPr lang="vi-VN" dirty="0"/>
-              <a:t>Độ phức tạp thời gian: O(n * m * l)</a:t>
-            </a:r>
-            <a:endParaRPr lang="vi-VN" dirty="0"/>
-          </a:p>
-          <a:p>
-            <a:pPr lvl="1">
-              <a:buFont typeface="Wingdings" panose="05000000000000000000" pitchFamily="2" charset="2"/>
-              <a:buChar char="Ø"/>
-            </a:pPr>
-            <a:r>
-              <a:rPr lang="vi-VN" dirty="0"/>
-              <a:t>n: số lượng mẫu, m: số lượng neuron trong lớp ẩn, l: số lượng lớp.</a:t>
-            </a:r>
-            <a:endParaRPr lang="vi-VN" dirty="0"/>
-          </a:p>
-          <a:p>
-            <a:pPr>
-              <a:buFont typeface="Arial" panose="020B0604020202090204" pitchFamily="34" charset="0"/>
-              <a:buChar char="•"/>
-            </a:pPr>
-            <a:r>
-              <a:rPr lang="vi-VN" b="1" dirty="0"/>
-              <a:t>Mô hình lai:</a:t>
-            </a:r>
-            <a:endParaRPr lang="vi-VN" b="1" dirty="0"/>
-          </a:p>
-          <a:p>
-            <a:pPr lvl="1">
-              <a:buFont typeface="Wingdings" panose="05000000000000000000" pitchFamily="2" charset="2"/>
-              <a:buChar char="Ø"/>
-            </a:pPr>
-            <a:r>
-              <a:rPr lang="vi-VN" dirty="0"/>
-              <a:t>Độ phức tạp thời gian: O(n * (p + m * l))</a:t>
-            </a:r>
-            <a:endParaRPr lang="vi-VN" dirty="0"/>
-          </a:p>
-          <a:p>
-            <a:pPr lvl="1">
-              <a:buFont typeface="Wingdings" panose="05000000000000000000" pitchFamily="2" charset="2"/>
-              <a:buChar char="Ø"/>
-            </a:pPr>
-            <a:r>
-              <a:rPr lang="vi-VN" dirty="0"/>
-              <a:t>Kết hợp độ phức tạp của cả hai mô hình trên.</a:t>
-            </a:r>
-            <a:endParaRPr lang="vi-VN" dirty="0"/>
-          </a:p>
-          <a:p>
-            <a:endParaRPr lang="en-US" dirty="0"/>
-          </a:p>
-        </p:txBody>
-      </p:sp>
+        </p:nvPicPr>
+        <p:blipFill>
+          <a:blip r:embed="rId1"/>
+          <a:stretch>
+            <a:fillRect/>
+          </a:stretch>
+        </p:blipFill>
+        <p:spPr>
+          <a:xfrm>
+            <a:off x="1324610" y="1327150"/>
+            <a:ext cx="9226550" cy="4413885"/>
+          </a:xfrm>
+          <a:prstGeom prst="rect">
+            <a:avLst/>
+          </a:prstGeom>
+        </p:spPr>
+      </p:pic>
     </p:spTree>
   </p:cSld>
   <p:clrMapOvr>
@@ -4192,58 +4033,44 @@
         </p:nvSpPr>
         <p:spPr/>
         <p:txBody>
-          <a:bodyPr/>
-          <a:p>
-            <a:r>
-              <a:rPr lang="en-US">
-                <a:sym typeface="+mn-ea"/>
-              </a:rPr>
-              <a:t>1. Hồi quy Logistic</a:t>
-            </a:r>
-            <a:endParaRPr lang="en-US"/>
-          </a:p>
-        </p:txBody>
-      </p:sp>
-      <p:sp>
-        <p:nvSpPr>
-          <p:cNvPr id="3" name="Content Placeholder 2"/>
-          <p:cNvSpPr>
-            <a:spLocks noGrp="1"/>
-          </p:cNvSpPr>
+          <a:bodyPr>
+            <a:normAutofit fontScale="90000"/>
+          </a:bodyPr>
+          <a:p>
+            <a:r>
+              <a:rPr lang="vi-VN" altLang="en-US"/>
+              <a:t>Dữ liệu dự báo sau khi chạy Logistic và Neural Network</a:t>
+            </a:r>
+            <a:endParaRPr lang="vi-VN" altLang="en-US"/>
+          </a:p>
+        </p:txBody>
+      </p:sp>
+      <p:pic>
+        <p:nvPicPr>
+          <p:cNvPr id="4" name="Content Placeholder 3"/>
+          <p:cNvPicPr>
+            <a:picLocks noChangeAspect="1"/>
+          </p:cNvPicPr>
           <p:nvPr>
             <p:ph idx="1"/>
           </p:nvPr>
-        </p:nvSpPr>
-        <p:spPr/>
-        <p:txBody>
-          <a:bodyPr>
-            <a:normAutofit/>
-          </a:bodyPr>
-          <a:p>
-            <a:endParaRPr lang="en-US"/>
-          </a:p>
-          <a:p>
-            <a:r>
-              <a:rPr lang="en-US"/>
-              <a:t>Hồi quy Logistic là một phương pháp thống kê được sử dụng để dự đoán kết quả của một biến nhị phân (binary) dựa trên một hoặc nhiều biến độc lập (predictors). Độ phức tạp tính toán của thuật toán hồi quy Logistic phụ thuộc vào số lượng mẫu (n) và số lượng đặc trưng (p).</a:t>
-            </a:r>
-            <a:endParaRPr lang="en-US"/>
-          </a:p>
-          <a:p>
-            <a:r>
-              <a:rPr lang="en-US"/>
-              <a:t>Công thức tính hàm sigmod:</a:t>
-            </a:r>
-            <a:endParaRPr lang="en-US"/>
-          </a:p>
-          <a:p>
-            <a:endParaRPr lang="en-US"/>
-          </a:p>
-          <a:p>
-            <a:endParaRPr lang="en-US"/>
-          </a:p>
-        </p:txBody>
-      </p:sp>
+        </p:nvPicPr>
+        <p:blipFill>
+          <a:blip r:embed="rId1"/>
+          <a:stretch>
+            <a:fillRect/>
+          </a:stretch>
+        </p:blipFill>
+        <p:spPr>
+          <a:xfrm>
+            <a:off x="1325245" y="1837690"/>
+            <a:ext cx="9166225" cy="4339590"/>
+          </a:xfrm>
+          <a:prstGeom prst="rect">
+            <a:avLst/>
+          </a:prstGeom>
+        </p:spPr>
+      </p:pic>
     </p:spTree>
   </p:cSld>
   <p:clrMapOvr>
@@ -4253,6 +4080,320 @@
 </file>
 
 <file path=ppt/slides/slide5.xml><?xml version="1.0" encoding="utf-8"?>
+<p:sld xmlns:a="http://schemas.openxmlformats.org/drawingml/2006/main" xmlns:r="http://schemas.openxmlformats.org/officeDocument/2006/relationships" xmlns:p="http://schemas.openxmlformats.org/presentationml/2006/main">
+  <p:cSld>
+    <p:spTree>
+      <p:nvGrpSpPr>
+        <p:cNvPr id="1" name=""/>
+        <p:cNvGrpSpPr/>
+        <p:nvPr/>
+      </p:nvGrpSpPr>
+      <p:grpSpPr>
+        <a:xfrm>
+          <a:off x="0" y="0"/>
+          <a:ext cx="0" cy="0"/>
+          <a:chOff x="0" y="0"/>
+          <a:chExt cx="0" cy="0"/>
+        </a:xfrm>
+      </p:grpSpPr>
+      <p:sp>
+        <p:nvSpPr>
+          <p:cNvPr id="2" name="Title 1"/>
+          <p:cNvSpPr>
+            <a:spLocks noGrp="1"/>
+          </p:cNvSpPr>
+          <p:nvPr>
+            <p:ph type="title"/>
+          </p:nvPr>
+        </p:nvSpPr>
+        <p:spPr/>
+        <p:txBody>
+          <a:bodyPr/>
+          <a:lstStyle/>
+          <a:p>
+            <a:r>
+              <a:rPr lang="en-US" dirty="0" err="1"/>
+              <a:t>Đánh</a:t>
+            </a:r>
+            <a:r>
+              <a:rPr lang="en-US" dirty="0"/>
+              <a:t> </a:t>
+            </a:r>
+            <a:r>
+              <a:rPr lang="en-US" dirty="0" err="1"/>
+              <a:t>giá</a:t>
+            </a:r>
+            <a:r>
+              <a:rPr lang="en-US" dirty="0"/>
+              <a:t> </a:t>
+            </a:r>
+            <a:r>
+              <a:rPr lang="en-US" dirty="0" err="1"/>
+              <a:t>độ</a:t>
+            </a:r>
+            <a:r>
+              <a:rPr lang="en-US" dirty="0"/>
+              <a:t> </a:t>
+            </a:r>
+            <a:r>
+              <a:rPr lang="en-US" dirty="0" err="1"/>
+              <a:t>phức</a:t>
+            </a:r>
+            <a:r>
+              <a:rPr lang="en-US" dirty="0"/>
+              <a:t> </a:t>
+            </a:r>
+            <a:r>
+              <a:rPr lang="en-US" dirty="0" err="1"/>
+              <a:t>tạp</a:t>
+            </a:r>
+            <a:r>
+              <a:rPr lang="en-US" dirty="0"/>
+              <a:t> </a:t>
+            </a:r>
+            <a:r>
+              <a:rPr lang="en-US" dirty="0" err="1"/>
+              <a:t>thuật</a:t>
+            </a:r>
+            <a:r>
+              <a:rPr lang="en-US" dirty="0"/>
+              <a:t> </a:t>
+            </a:r>
+            <a:r>
+              <a:rPr lang="en-US" dirty="0" err="1"/>
+              <a:t>toán</a:t>
+            </a:r>
+            <a:r>
+              <a:rPr lang="en-US" dirty="0"/>
+              <a:t> </a:t>
+            </a:r>
+            <a:r>
+              <a:rPr lang="en-US" dirty="0" err="1"/>
+              <a:t>cài</a:t>
+            </a:r>
+            <a:r>
+              <a:rPr lang="en-US" dirty="0"/>
+              <a:t> </a:t>
+            </a:r>
+            <a:r>
+              <a:rPr lang="en-US" dirty="0" err="1"/>
+              <a:t>đặt</a:t>
+            </a:r>
+            <a:endParaRPr lang="en-US" dirty="0"/>
+          </a:p>
+        </p:txBody>
+      </p:sp>
+      <p:sp>
+        <p:nvSpPr>
+          <p:cNvPr id="3" name="Content Placeholder 2"/>
+          <p:cNvSpPr>
+            <a:spLocks noGrp="1"/>
+          </p:cNvSpPr>
+          <p:nvPr>
+            <p:ph idx="1"/>
+          </p:nvPr>
+        </p:nvSpPr>
+        <p:spPr/>
+        <p:txBody>
+          <a:bodyPr>
+            <a:normAutofit/>
+          </a:bodyPr>
+          <a:lstStyle/>
+          <a:p>
+            <a:pPr>
+              <a:buFont typeface="Arial" panose="020B0604020202090204" pitchFamily="34" charset="0"/>
+              <a:buChar char="•"/>
+            </a:pPr>
+            <a:r>
+              <a:rPr lang="vi-VN" b="1" dirty="0"/>
+              <a:t>Hồi quy Logistic:</a:t>
+            </a:r>
+            <a:endParaRPr lang="vi-VN" b="1" dirty="0"/>
+          </a:p>
+          <a:p>
+            <a:pPr lvl="1">
+              <a:buFont typeface="Wingdings" panose="05000000000000000000" pitchFamily="2" charset="2"/>
+              <a:buChar char="Ø"/>
+            </a:pPr>
+            <a:r>
+              <a:rPr lang="vi-VN" dirty="0"/>
+              <a:t>Độ phức tạp thời gian: O(n * p)</a:t>
+            </a:r>
+            <a:endParaRPr lang="vi-VN" dirty="0"/>
+          </a:p>
+          <a:p>
+            <a:pPr lvl="1">
+              <a:buFont typeface="Wingdings" panose="05000000000000000000" pitchFamily="2" charset="2"/>
+              <a:buChar char="Ø"/>
+            </a:pPr>
+            <a:r>
+              <a:rPr lang="vi-VN" dirty="0"/>
+              <a:t>n: số lượng mẫu, p: số lượng đặc trưng.</a:t>
+            </a:r>
+            <a:endParaRPr lang="vi-VN" dirty="0"/>
+          </a:p>
+          <a:p>
+            <a:pPr>
+              <a:buFont typeface="Arial" panose="020B0604020202090204" pitchFamily="34" charset="0"/>
+              <a:buChar char="•"/>
+            </a:pPr>
+            <a:r>
+              <a:rPr lang="vi-VN" b="1" dirty="0"/>
+              <a:t>Mạng Neural (MLP):</a:t>
+            </a:r>
+            <a:endParaRPr lang="vi-VN" b="1" dirty="0"/>
+          </a:p>
+          <a:p>
+            <a:pPr lvl="1">
+              <a:buFont typeface="Wingdings" panose="05000000000000000000" pitchFamily="2" charset="2"/>
+              <a:buChar char="Ø"/>
+            </a:pPr>
+            <a:r>
+              <a:rPr lang="vi-VN" dirty="0"/>
+              <a:t>Độ phức tạp thời gian: O(n * m * l)</a:t>
+            </a:r>
+            <a:endParaRPr lang="vi-VN" dirty="0"/>
+          </a:p>
+          <a:p>
+            <a:pPr lvl="1">
+              <a:buFont typeface="Wingdings" panose="05000000000000000000" pitchFamily="2" charset="2"/>
+              <a:buChar char="Ø"/>
+            </a:pPr>
+            <a:r>
+              <a:rPr lang="vi-VN" dirty="0"/>
+              <a:t>n: số lượng mẫu, m: số lượng neuron trong lớp ẩn, l: số lượng lớp.</a:t>
+            </a:r>
+            <a:endParaRPr lang="vi-VN" dirty="0"/>
+          </a:p>
+          <a:p>
+            <a:pPr>
+              <a:buFont typeface="Arial" panose="020B0604020202090204" pitchFamily="34" charset="0"/>
+              <a:buChar char="•"/>
+            </a:pPr>
+            <a:r>
+              <a:rPr lang="vi-VN" b="1" dirty="0"/>
+              <a:t>Mô hình lai:</a:t>
+            </a:r>
+            <a:endParaRPr lang="vi-VN" b="1" dirty="0"/>
+          </a:p>
+          <a:p>
+            <a:pPr lvl="1">
+              <a:buFont typeface="Wingdings" panose="05000000000000000000" pitchFamily="2" charset="2"/>
+              <a:buChar char="Ø"/>
+            </a:pPr>
+            <a:r>
+              <a:rPr lang="vi-VN" dirty="0"/>
+              <a:t>Độ phức tạp thời gian: O(n * (p + m * l))</a:t>
+            </a:r>
+            <a:endParaRPr lang="vi-VN" dirty="0"/>
+          </a:p>
+          <a:p>
+            <a:pPr lvl="1">
+              <a:buFont typeface="Wingdings" panose="05000000000000000000" pitchFamily="2" charset="2"/>
+              <a:buChar char="Ø"/>
+            </a:pPr>
+            <a:r>
+              <a:rPr lang="vi-VN" dirty="0"/>
+              <a:t>Kết hợp độ phức tạp của cả hai mô hình trên.</a:t>
+            </a:r>
+            <a:endParaRPr lang="vi-VN" dirty="0"/>
+          </a:p>
+          <a:p>
+            <a:endParaRPr lang="en-US" dirty="0"/>
+          </a:p>
+        </p:txBody>
+      </p:sp>
+    </p:spTree>
+  </p:cSld>
+  <p:clrMapOvr>
+    <a:masterClrMapping/>
+  </p:clrMapOvr>
+</p:sld>
+</file>
+
+<file path=ppt/slides/slide6.xml><?xml version="1.0" encoding="utf-8"?>
+<p:sld xmlns:a="http://schemas.openxmlformats.org/drawingml/2006/main" xmlns:r="http://schemas.openxmlformats.org/officeDocument/2006/relationships" xmlns:p="http://schemas.openxmlformats.org/presentationml/2006/main">
+  <p:cSld>
+    <p:spTree>
+      <p:nvGrpSpPr>
+        <p:cNvPr id="1" name=""/>
+        <p:cNvGrpSpPr/>
+        <p:nvPr/>
+      </p:nvGrpSpPr>
+      <p:grpSpPr/>
+      <p:sp>
+        <p:nvSpPr>
+          <p:cNvPr id="2" name="Title 1"/>
+          <p:cNvSpPr>
+            <a:spLocks noGrp="1"/>
+          </p:cNvSpPr>
+          <p:nvPr>
+            <p:ph type="title"/>
+          </p:nvPr>
+        </p:nvSpPr>
+        <p:spPr/>
+        <p:txBody>
+          <a:bodyPr/>
+          <a:p>
+            <a:r>
+              <a:rPr lang="en-US">
+                <a:sym typeface="+mn-ea"/>
+              </a:rPr>
+              <a:t>1. Hồi quy Logistic</a:t>
+            </a:r>
+            <a:endParaRPr lang="en-US"/>
+          </a:p>
+        </p:txBody>
+      </p:sp>
+      <p:sp>
+        <p:nvSpPr>
+          <p:cNvPr id="3" name="Content Placeholder 2"/>
+          <p:cNvSpPr>
+            <a:spLocks noGrp="1"/>
+          </p:cNvSpPr>
+          <p:nvPr>
+            <p:ph idx="1"/>
+          </p:nvPr>
+        </p:nvSpPr>
+        <p:spPr/>
+        <p:txBody>
+          <a:bodyPr>
+            <a:normAutofit/>
+          </a:bodyPr>
+          <a:p>
+            <a:endParaRPr lang="en-US"/>
+          </a:p>
+          <a:p>
+            <a:r>
+              <a:rPr lang="en-US"/>
+              <a:t>Hồi quy Logistic là một phương pháp thống kê được sử dụng để dự đoán kết quả của một biến nhị phân (binary) dựa trên một hoặc nhiều biến độc lập (predictors). Độ phức tạp tính toán của thuật toán hồi quy Logistic phụ thuộc vào số lượng mẫu (n) và số lượng đặc trưng (p).</a:t>
+            </a:r>
+            <a:endParaRPr lang="en-US"/>
+          </a:p>
+          <a:p>
+            <a:r>
+              <a:rPr lang="en-US"/>
+              <a:t>Công thức tính hàm sigmod:</a:t>
+            </a:r>
+            <a:endParaRPr lang="en-US"/>
+          </a:p>
+          <a:p>
+            <a:endParaRPr lang="en-US"/>
+          </a:p>
+          <a:p>
+            <a:endParaRPr lang="en-US"/>
+          </a:p>
+        </p:txBody>
+      </p:sp>
+    </p:spTree>
+  </p:cSld>
+  <p:clrMapOvr>
+    <a:masterClrMapping/>
+  </p:clrMapOvr>
+</p:sld>
+</file>
+
+<file path=ppt/slides/slide7.xml><?xml version="1.0" encoding="utf-8"?>
 <p:sld xmlns:a="http://schemas.openxmlformats.org/drawingml/2006/main" xmlns:r="http://schemas.openxmlformats.org/officeDocument/2006/relationships" xmlns:p="http://schemas.openxmlformats.org/presentationml/2006/main">
   <p:cSld>
     <p:spTree>
@@ -4296,7 +4437,7 @@
 </p:sld>
 </file>
 
-<file path=ppt/slides/slide6.xml><?xml version="1.0" encoding="utf-8"?>
+<file path=ppt/slides/slide8.xml><?xml version="1.0" encoding="utf-8"?>
 <p:sld xmlns:a="http://schemas.openxmlformats.org/drawingml/2006/main" xmlns:r="http://schemas.openxmlformats.org/officeDocument/2006/relationships" xmlns:p="http://schemas.openxmlformats.org/presentationml/2006/main">
   <p:cSld>
     <p:spTree>
@@ -4461,7 +4602,7 @@
 </p:sld>
 </file>
 
-<file path=ppt/slides/slide7.xml><?xml version="1.0" encoding="utf-8"?>
+<file path=ppt/slides/slide9.xml><?xml version="1.0" encoding="utf-8"?>
 <p:sld xmlns:a="http://schemas.openxmlformats.org/drawingml/2006/main" xmlns:r="http://schemas.openxmlformats.org/officeDocument/2006/relationships" xmlns:p="http://schemas.openxmlformats.org/presentationml/2006/main">
   <p:cSld>
     <p:spTree>

</xml_diff>